<commit_message>
added some lines on presentation file
</commit_message>
<xml_diff>
--- a/GIT_Presentation.pptx
+++ b/GIT_Presentation.pptx
@@ -134,18 +134,18 @@
   <pc:docChgLst>
     <pc:chgData name="Moro, Marco" userId="d7bcd177-0ddd-42e9-8665-046e17e9d9ac" providerId="ADAL" clId="{A320CDC5-C1E7-483C-A72D-556C61A0B06B}"/>
     <pc:docChg chg="undo custSel addSld modSld">
-      <pc:chgData name="Moro, Marco" userId="d7bcd177-0ddd-42e9-8665-046e17e9d9ac" providerId="ADAL" clId="{A320CDC5-C1E7-483C-A72D-556C61A0B06B}" dt="2024-01-08T10:13:33.822" v="91" actId="26606"/>
+      <pc:chgData name="Moro, Marco" userId="d7bcd177-0ddd-42e9-8665-046e17e9d9ac" providerId="ADAL" clId="{A320CDC5-C1E7-483C-A72D-556C61A0B06B}" dt="2024-01-08T15:45:41.684" v="97" actId="20577"/>
       <pc:docMkLst>
         <pc:docMk/>
       </pc:docMkLst>
       <pc:sldChg chg="modSp mod">
-        <pc:chgData name="Moro, Marco" userId="d7bcd177-0ddd-42e9-8665-046e17e9d9ac" providerId="ADAL" clId="{A320CDC5-C1E7-483C-A72D-556C61A0B06B}" dt="2024-01-08T10:05:02.398" v="12" actId="20577"/>
+        <pc:chgData name="Moro, Marco" userId="d7bcd177-0ddd-42e9-8665-046e17e9d9ac" providerId="ADAL" clId="{A320CDC5-C1E7-483C-A72D-556C61A0B06B}" dt="2024-01-08T15:45:41.684" v="97" actId="20577"/>
         <pc:sldMkLst>
           <pc:docMk/>
           <pc:sldMk cId="3355627421" sldId="260"/>
         </pc:sldMkLst>
         <pc:spChg chg="mod">
-          <ac:chgData name="Moro, Marco" userId="d7bcd177-0ddd-42e9-8665-046e17e9d9ac" providerId="ADAL" clId="{A320CDC5-C1E7-483C-A72D-556C61A0B06B}" dt="2024-01-08T10:05:02.398" v="12" actId="20577"/>
+          <ac:chgData name="Moro, Marco" userId="d7bcd177-0ddd-42e9-8665-046e17e9d9ac" providerId="ADAL" clId="{A320CDC5-C1E7-483C-A72D-556C61A0B06B}" dt="2024-01-08T15:45:41.684" v="97" actId="20577"/>
           <ac:spMkLst>
             <pc:docMk/>
             <pc:sldMk cId="3355627421" sldId="260"/>
@@ -4850,7 +4850,7 @@
             </a:r>
             <a:r>
               <a:rPr lang="en-US"/>
-              <a:t>.   </a:t>
+              <a:t>. </a:t>
             </a:r>
             <a:endParaRPr lang="en-GB" dirty="0"/>
           </a:p>

</xml_diff>

<commit_message>
new slides for jenkins
</commit_message>
<xml_diff>
--- a/GIT_Presentation.pptx
+++ b/GIT_Presentation.pptx
@@ -15,6 +15,7 @@
     <p:sldId id="263" r:id="rId9"/>
     <p:sldId id="264" r:id="rId10"/>
     <p:sldId id="265" r:id="rId11"/>
+    <p:sldId id="266" r:id="rId12"/>
   </p:sldIdLst>
   <p:sldSz cx="12192000" cy="6858000"/>
   <p:notesSz cx="6858000" cy="9144000"/>
@@ -124,13 +125,68 @@
 <file path=ppt/revisionInfo.xml><?xml version="1.0" encoding="utf-8"?>
 <p1510:revInfo xmlns:a="http://schemas.openxmlformats.org/drawingml/2006/main" xmlns:r="http://schemas.openxmlformats.org/officeDocument/2006/relationships" xmlns:p1510="http://schemas.microsoft.com/office/powerpoint/2015/10/main">
   <p1510:revLst>
-    <p1510:client id="{A320CDC5-C1E7-483C-A72D-556C61A0B06B}" v="5" dt="2024-01-08T10:13:31.277"/>
+    <p1510:client id="{647E9231-494A-4E99-9DD1-6F81CBDC05D0}" v="1" dt="2024-06-06T17:01:55.912"/>
   </p1510:revLst>
 </p1510:revInfo>
 </file>
 
 <file path=ppt/changesInfos/changesInfo1.xml><?xml version="1.0" encoding="utf-8"?>
 <pc:chgInfo xmlns:a="http://schemas.openxmlformats.org/drawingml/2006/main" xmlns:r="http://schemas.openxmlformats.org/officeDocument/2006/relationships" xmlns:ac="http://schemas.microsoft.com/office/drawing/2013/main/command" xmlns:pc="http://schemas.microsoft.com/office/powerpoint/2013/main/command">
+  <pc:docChgLst>
+    <pc:chgData name="Moro, Marco" userId="d7bcd177-0ddd-42e9-8665-046e17e9d9ac" providerId="ADAL" clId="{647E9231-494A-4E99-9DD1-6F81CBDC05D0}"/>
+    <pc:docChg chg="custSel addSld delSld modSld">
+      <pc:chgData name="Moro, Marco" userId="d7bcd177-0ddd-42e9-8665-046e17e9d9ac" providerId="ADAL" clId="{647E9231-494A-4E99-9DD1-6F81CBDC05D0}" dt="2024-06-06T17:02:20.303" v="42" actId="26606"/>
+      <pc:docMkLst>
+        <pc:docMk/>
+      </pc:docMkLst>
+      <pc:sldChg chg="addSp delSp modSp new mod setBg">
+        <pc:chgData name="Moro, Marco" userId="d7bcd177-0ddd-42e9-8665-046e17e9d9ac" providerId="ADAL" clId="{647E9231-494A-4E99-9DD1-6F81CBDC05D0}" dt="2024-06-06T17:02:20.303" v="42" actId="26606"/>
+        <pc:sldMkLst>
+          <pc:docMk/>
+          <pc:sldMk cId="1792597823" sldId="266"/>
+        </pc:sldMkLst>
+        <pc:spChg chg="mod">
+          <ac:chgData name="Moro, Marco" userId="d7bcd177-0ddd-42e9-8665-046e17e9d9ac" providerId="ADAL" clId="{647E9231-494A-4E99-9DD1-6F81CBDC05D0}" dt="2024-06-06T17:02:20.303" v="42" actId="26606"/>
+          <ac:spMkLst>
+            <pc:docMk/>
+            <pc:sldMk cId="1792597823" sldId="266"/>
+            <ac:spMk id="2" creationId="{0C78DAE8-0E3A-5047-60F6-F985CDF5D69C}"/>
+          </ac:spMkLst>
+        </pc:spChg>
+        <pc:spChg chg="del">
+          <ac:chgData name="Moro, Marco" userId="d7bcd177-0ddd-42e9-8665-046e17e9d9ac" providerId="ADAL" clId="{647E9231-494A-4E99-9DD1-6F81CBDC05D0}" dt="2024-06-06T17:01:55.912" v="3" actId="931"/>
+          <ac:spMkLst>
+            <pc:docMk/>
+            <pc:sldMk cId="1792597823" sldId="266"/>
+            <ac:spMk id="3" creationId="{3559E9A7-6625-6239-2466-E4CCDF92C587}"/>
+          </ac:spMkLst>
+        </pc:spChg>
+        <pc:spChg chg="add">
+          <ac:chgData name="Moro, Marco" userId="d7bcd177-0ddd-42e9-8665-046e17e9d9ac" providerId="ADAL" clId="{647E9231-494A-4E99-9DD1-6F81CBDC05D0}" dt="2024-06-06T17:02:20.303" v="42" actId="26606"/>
+          <ac:spMkLst>
+            <pc:docMk/>
+            <pc:sldMk cId="1792597823" sldId="266"/>
+            <ac:spMk id="10" creationId="{D4771268-CB57-404A-9271-370EB28F6090}"/>
+          </ac:spMkLst>
+        </pc:spChg>
+        <pc:picChg chg="add mod">
+          <ac:chgData name="Moro, Marco" userId="d7bcd177-0ddd-42e9-8665-046e17e9d9ac" providerId="ADAL" clId="{647E9231-494A-4E99-9DD1-6F81CBDC05D0}" dt="2024-06-06T17:02:20.303" v="42" actId="26606"/>
+          <ac:picMkLst>
+            <pc:docMk/>
+            <pc:sldMk cId="1792597823" sldId="266"/>
+            <ac:picMk id="5" creationId="{414963B2-5AE2-0148-DB75-096746B055EE}"/>
+          </ac:picMkLst>
+        </pc:picChg>
+      </pc:sldChg>
+      <pc:sldChg chg="new del">
+        <pc:chgData name="Moro, Marco" userId="d7bcd177-0ddd-42e9-8665-046e17e9d9ac" providerId="ADAL" clId="{647E9231-494A-4E99-9DD1-6F81CBDC05D0}" dt="2024-06-06T17:01:01.493" v="1" actId="47"/>
+        <pc:sldMkLst>
+          <pc:docMk/>
+          <pc:sldMk cId="2644354781" sldId="266"/>
+        </pc:sldMkLst>
+      </pc:sldChg>
+    </pc:docChg>
+  </pc:docChgLst>
   <pc:docChgLst>
     <pc:chgData name="Moro, Marco" userId="d7bcd177-0ddd-42e9-8665-046e17e9d9ac" providerId="ADAL" clId="{A320CDC5-C1E7-483C-A72D-556C61A0B06B}"/>
     <pc:docChg chg="undo custSel addSld modSld">
@@ -502,7 +558,7 @@
           <a:p>
             <a:fld id="{1076C589-445D-4DC3-9410-7A922580E96D}" type="datetimeFigureOut">
               <a:rPr lang="en-GB" smtClean="0"/>
-              <a:t>08/01/2024</a:t>
+              <a:t>06/06/2024</a:t>
             </a:fld>
             <a:endParaRPr lang="en-GB"/>
           </a:p>
@@ -702,7 +758,7 @@
           <a:p>
             <a:fld id="{1076C589-445D-4DC3-9410-7A922580E96D}" type="datetimeFigureOut">
               <a:rPr lang="en-GB" smtClean="0"/>
-              <a:t>08/01/2024</a:t>
+              <a:t>06/06/2024</a:t>
             </a:fld>
             <a:endParaRPr lang="en-GB"/>
           </a:p>
@@ -912,7 +968,7 @@
           <a:p>
             <a:fld id="{1076C589-445D-4DC3-9410-7A922580E96D}" type="datetimeFigureOut">
               <a:rPr lang="en-GB" smtClean="0"/>
-              <a:t>08/01/2024</a:t>
+              <a:t>06/06/2024</a:t>
             </a:fld>
             <a:endParaRPr lang="en-GB"/>
           </a:p>
@@ -1112,7 +1168,7 @@
           <a:p>
             <a:fld id="{1076C589-445D-4DC3-9410-7A922580E96D}" type="datetimeFigureOut">
               <a:rPr lang="en-GB" smtClean="0"/>
-              <a:t>08/01/2024</a:t>
+              <a:t>06/06/2024</a:t>
             </a:fld>
             <a:endParaRPr lang="en-GB"/>
           </a:p>
@@ -1388,7 +1444,7 @@
           <a:p>
             <a:fld id="{1076C589-445D-4DC3-9410-7A922580E96D}" type="datetimeFigureOut">
               <a:rPr lang="en-GB" smtClean="0"/>
-              <a:t>08/01/2024</a:t>
+              <a:t>06/06/2024</a:t>
             </a:fld>
             <a:endParaRPr lang="en-GB"/>
           </a:p>
@@ -1656,7 +1712,7 @@
           <a:p>
             <a:fld id="{1076C589-445D-4DC3-9410-7A922580E96D}" type="datetimeFigureOut">
               <a:rPr lang="en-GB" smtClean="0"/>
-              <a:t>08/01/2024</a:t>
+              <a:t>06/06/2024</a:t>
             </a:fld>
             <a:endParaRPr lang="en-GB"/>
           </a:p>
@@ -2071,7 +2127,7 @@
           <a:p>
             <a:fld id="{1076C589-445D-4DC3-9410-7A922580E96D}" type="datetimeFigureOut">
               <a:rPr lang="en-GB" smtClean="0"/>
-              <a:t>08/01/2024</a:t>
+              <a:t>06/06/2024</a:t>
             </a:fld>
             <a:endParaRPr lang="en-GB"/>
           </a:p>
@@ -2213,7 +2269,7 @@
           <a:p>
             <a:fld id="{1076C589-445D-4DC3-9410-7A922580E96D}" type="datetimeFigureOut">
               <a:rPr lang="en-GB" smtClean="0"/>
-              <a:t>08/01/2024</a:t>
+              <a:t>06/06/2024</a:t>
             </a:fld>
             <a:endParaRPr lang="en-GB"/>
           </a:p>
@@ -2326,7 +2382,7 @@
           <a:p>
             <a:fld id="{1076C589-445D-4DC3-9410-7A922580E96D}" type="datetimeFigureOut">
               <a:rPr lang="en-GB" smtClean="0"/>
-              <a:t>08/01/2024</a:t>
+              <a:t>06/06/2024</a:t>
             </a:fld>
             <a:endParaRPr lang="en-GB"/>
           </a:p>
@@ -2639,7 +2695,7 @@
           <a:p>
             <a:fld id="{1076C589-445D-4DC3-9410-7A922580E96D}" type="datetimeFigureOut">
               <a:rPr lang="en-GB" smtClean="0"/>
-              <a:t>08/01/2024</a:t>
+              <a:t>06/06/2024</a:t>
             </a:fld>
             <a:endParaRPr lang="en-GB"/>
           </a:p>
@@ -2928,7 +2984,7 @@
           <a:p>
             <a:fld id="{1076C589-445D-4DC3-9410-7A922580E96D}" type="datetimeFigureOut">
               <a:rPr lang="en-GB" smtClean="0"/>
-              <a:t>08/01/2024</a:t>
+              <a:t>06/06/2024</a:t>
             </a:fld>
             <a:endParaRPr lang="en-GB"/>
           </a:p>
@@ -3171,7 +3227,7 @@
           <a:p>
             <a:fld id="{1076C589-445D-4DC3-9410-7A922580E96D}" type="datetimeFigureOut">
               <a:rPr lang="en-GB" smtClean="0"/>
-              <a:t>08/01/2024</a:t>
+              <a:t>06/06/2024</a:t>
             </a:fld>
             <a:endParaRPr lang="en-GB"/>
           </a:p>
@@ -4037,6 +4093,192 @@
     <p:extLst>
       <p:ext uri="{BB962C8B-B14F-4D97-AF65-F5344CB8AC3E}">
         <p14:creationId xmlns:p14="http://schemas.microsoft.com/office/powerpoint/2010/main" val="1003081493"/>
+      </p:ext>
+    </p:extLst>
+  </p:cSld>
+  <p:clrMapOvr>
+    <a:masterClrMapping/>
+  </p:clrMapOvr>
+</p:sld>
+</file>
+
+<file path=ppt/slides/slide11.xml><?xml version="1.0" encoding="utf-8"?>
+<p:sld xmlns:a="http://schemas.openxmlformats.org/drawingml/2006/main" xmlns:r="http://schemas.openxmlformats.org/officeDocument/2006/relationships" xmlns:p="http://schemas.openxmlformats.org/presentationml/2006/main">
+  <p:cSld>
+    <p:bg>
+      <p:bgPr>
+        <a:solidFill>
+          <a:schemeClr val="bg1"/>
+        </a:solidFill>
+        <a:effectLst/>
+      </p:bgPr>
+    </p:bg>
+    <p:spTree>
+      <p:nvGrpSpPr>
+        <p:cNvPr id="1" name=""/>
+        <p:cNvGrpSpPr/>
+        <p:nvPr/>
+      </p:nvGrpSpPr>
+      <p:grpSpPr>
+        <a:xfrm>
+          <a:off x="0" y="0"/>
+          <a:ext cx="0" cy="0"/>
+          <a:chOff x="0" y="0"/>
+          <a:chExt cx="0" cy="0"/>
+        </a:xfrm>
+      </p:grpSpPr>
+      <p:sp>
+        <p:nvSpPr>
+          <p:cNvPr id="10" name="Down Arrow 7">
+            <a:extLst>
+              <a:ext uri="{FF2B5EF4-FFF2-40B4-BE49-F238E27FC236}">
+                <a16:creationId xmlns:a16="http://schemas.microsoft.com/office/drawing/2014/main" id="{D4771268-CB57-404A-9271-370EB28F6090}"/>
+              </a:ext>
+              <a:ext uri="{C183D7F6-B498-43B3-948B-1728B52AA6E4}">
+                <adec:decorative xmlns:adec="http://schemas.microsoft.com/office/drawing/2017/decorative" val="1"/>
+              </a:ext>
+            </a:extLst>
+          </p:cNvPr>
+          <p:cNvSpPr>
+            <a:spLocks noGrp="1" noRot="1" noChangeAspect="1" noMove="1" noResize="1" noEditPoints="1" noAdjustHandles="1" noChangeArrowheads="1" noChangeShapeType="1" noTextEdit="1"/>
+          </p:cNvSpPr>
+          <p:nvPr>
+            <p:extLst>
+              <p:ext uri="{386F3935-93C4-4BCD-93E2-E3B085C9AB24}">
+                <p16:designElem xmlns:p16="http://schemas.microsoft.com/office/powerpoint/2015/main" val="1"/>
+              </p:ext>
+            </p:extLst>
+          </p:nvPr>
+        </p:nvSpPr>
+        <p:spPr>
+          <a:xfrm rot="16200000">
+            <a:off x="800100" y="1491343"/>
+            <a:ext cx="3333749" cy="3499103"/>
+          </a:xfrm>
+          <a:prstGeom prst="downArrow">
+            <a:avLst>
+              <a:gd name="adj1" fmla="val 100000"/>
+              <a:gd name="adj2" fmla="val 15788"/>
+            </a:avLst>
+          </a:prstGeom>
+          <a:solidFill>
+            <a:srgbClr val="404040"/>
+          </a:solidFill>
+          <a:ln w="53975">
+            <a:noFill/>
+          </a:ln>
+        </p:spPr>
+        <p:style>
+          <a:lnRef idx="2">
+            <a:schemeClr val="accent1">
+              <a:shade val="50000"/>
+            </a:schemeClr>
+          </a:lnRef>
+          <a:fillRef idx="1">
+            <a:schemeClr val="accent1"/>
+          </a:fillRef>
+          <a:effectRef idx="0">
+            <a:schemeClr val="accent1"/>
+          </a:effectRef>
+          <a:fontRef idx="minor">
+            <a:schemeClr val="lt1"/>
+          </a:fontRef>
+        </p:style>
+        <p:txBody>
+          <a:bodyPr rtlCol="0" anchor="ctr"/>
+          <a:lstStyle/>
+          <a:p>
+            <a:pPr algn="ctr"/>
+            <a:endParaRPr lang="en-US"/>
+          </a:p>
+        </p:txBody>
+      </p:sp>
+      <p:sp>
+        <p:nvSpPr>
+          <p:cNvPr id="2" name="Title 1">
+            <a:extLst>
+              <a:ext uri="{FF2B5EF4-FFF2-40B4-BE49-F238E27FC236}">
+                <a16:creationId xmlns:a16="http://schemas.microsoft.com/office/drawing/2014/main" id="{0C78DAE8-0E3A-5047-60F6-F985CDF5D69C}"/>
+              </a:ext>
+            </a:extLst>
+          </p:cNvPr>
+          <p:cNvSpPr>
+            <a:spLocks noGrp="1"/>
+          </p:cNvSpPr>
+          <p:nvPr>
+            <p:ph type="title"/>
+          </p:nvPr>
+        </p:nvSpPr>
+        <p:spPr>
+          <a:xfrm>
+            <a:off x="1028700" y="1967266"/>
+            <a:ext cx="2628900" cy="2547257"/>
+          </a:xfrm>
+          <a:noFill/>
+        </p:spPr>
+        <p:txBody>
+          <a:bodyPr vert="horz" lIns="91440" tIns="45720" rIns="91440" bIns="45720" rtlCol="0" anchor="ctr">
+            <a:normAutofit/>
+          </a:bodyPr>
+          <a:lstStyle/>
+          <a:p>
+            <a:pPr algn="ctr"/>
+            <a:r>
+              <a:rPr lang="en-US" sz="3600" kern="1200">
+                <a:solidFill>
+                  <a:srgbClr val="FFFFFF"/>
+                </a:solidFill>
+                <a:latin typeface="+mj-lt"/>
+                <a:ea typeface="+mj-ea"/>
+                <a:cs typeface="+mj-cs"/>
+              </a:rPr>
+              <a:t>Jenkins Jobs Menu </a:t>
+            </a:r>
+          </a:p>
+        </p:txBody>
+      </p:sp>
+      <p:pic>
+        <p:nvPicPr>
+          <p:cNvPr id="5" name="Content Placeholder 4" descr="A screenshot of a computer&#10;&#10;Description automatically generated">
+            <a:extLst>
+              <a:ext uri="{FF2B5EF4-FFF2-40B4-BE49-F238E27FC236}">
+                <a16:creationId xmlns:a16="http://schemas.microsoft.com/office/drawing/2014/main" id="{414963B2-5AE2-0148-DB75-096746B055EE}"/>
+              </a:ext>
+            </a:extLst>
+          </p:cNvPr>
+          <p:cNvPicPr>
+            <a:picLocks noGrp="1" noChangeAspect="1"/>
+          </p:cNvPicPr>
+          <p:nvPr>
+            <p:ph idx="1"/>
+          </p:nvPr>
+        </p:nvPicPr>
+        <p:blipFill>
+          <a:blip r:embed="rId2">
+            <a:extLst>
+              <a:ext uri="{28A0092B-C50C-407E-A947-70E740481C1C}">
+                <a14:useLocalDpi xmlns:a14="http://schemas.microsoft.com/office/drawing/2010/main" val="0"/>
+              </a:ext>
+            </a:extLst>
+          </a:blip>
+          <a:stretch>
+            <a:fillRect/>
+          </a:stretch>
+        </p:blipFill>
+        <p:spPr>
+          <a:xfrm>
+            <a:off x="4777316" y="1054590"/>
+            <a:ext cx="6780700" cy="4746490"/>
+          </a:xfrm>
+          <a:prstGeom prst="rect">
+            <a:avLst/>
+          </a:prstGeom>
+        </p:spPr>
+      </p:pic>
+    </p:spTree>
+    <p:extLst>
+      <p:ext uri="{BB962C8B-B14F-4D97-AF65-F5344CB8AC3E}">
+        <p14:creationId xmlns:p14="http://schemas.microsoft.com/office/powerpoint/2010/main" val="1792597823"/>
       </p:ext>
     </p:extLst>
   </p:cSld>

</xml_diff>

<commit_message>
more slides into git presentation
</commit_message>
<xml_diff>
--- a/GIT_Presentation.pptx
+++ b/GIT_Presentation.pptx
@@ -16,6 +16,7 @@
     <p:sldId id="264" r:id="rId10"/>
     <p:sldId id="265" r:id="rId11"/>
     <p:sldId id="266" r:id="rId12"/>
+    <p:sldId id="267" r:id="rId13"/>
   </p:sldIdLst>
   <p:sldSz cx="12192000" cy="6858000"/>
   <p:notesSz cx="6858000" cy="9144000"/>
@@ -125,7 +126,7 @@
 <file path=ppt/revisionInfo.xml><?xml version="1.0" encoding="utf-8"?>
 <p1510:revInfo xmlns:a="http://schemas.openxmlformats.org/drawingml/2006/main" xmlns:r="http://schemas.openxmlformats.org/officeDocument/2006/relationships" xmlns:p1510="http://schemas.microsoft.com/office/powerpoint/2015/10/main">
   <p1510:revLst>
-    <p1510:client id="{647E9231-494A-4E99-9DD1-6F81CBDC05D0}" v="1" dt="2024-06-06T17:01:55.912"/>
+    <p1510:client id="{647E9231-494A-4E99-9DD1-6F81CBDC05D0}" v="3" dt="2024-06-11T06:38:54.931"/>
   </p1510:revLst>
 </p1510:revInfo>
 </file>
@@ -134,8 +135,8 @@
 <pc:chgInfo xmlns:a="http://schemas.openxmlformats.org/drawingml/2006/main" xmlns:r="http://schemas.openxmlformats.org/officeDocument/2006/relationships" xmlns:ac="http://schemas.microsoft.com/office/drawing/2013/main/command" xmlns:pc="http://schemas.microsoft.com/office/powerpoint/2013/main/command">
   <pc:docChgLst>
     <pc:chgData name="Moro, Marco" userId="d7bcd177-0ddd-42e9-8665-046e17e9d9ac" providerId="ADAL" clId="{647E9231-494A-4E99-9DD1-6F81CBDC05D0}"/>
-    <pc:docChg chg="custSel addSld delSld modSld">
-      <pc:chgData name="Moro, Marco" userId="d7bcd177-0ddd-42e9-8665-046e17e9d9ac" providerId="ADAL" clId="{647E9231-494A-4E99-9DD1-6F81CBDC05D0}" dt="2024-06-06T17:02:20.303" v="42" actId="26606"/>
+    <pc:docChg chg="undo custSel addSld delSld modSld">
+      <pc:chgData name="Moro, Marco" userId="d7bcd177-0ddd-42e9-8665-046e17e9d9ac" providerId="ADAL" clId="{647E9231-494A-4E99-9DD1-6F81CBDC05D0}" dt="2024-06-11T06:39:23.556" v="71" actId="26606"/>
       <pc:docMkLst>
         <pc:docMk/>
       </pc:docMkLst>
@@ -184,6 +185,93 @@
           <pc:docMk/>
           <pc:sldMk cId="2644354781" sldId="266"/>
         </pc:sldMkLst>
+      </pc:sldChg>
+      <pc:sldChg chg="addSp delSp modSp new mod setBg">
+        <pc:chgData name="Moro, Marco" userId="d7bcd177-0ddd-42e9-8665-046e17e9d9ac" providerId="ADAL" clId="{647E9231-494A-4E99-9DD1-6F81CBDC05D0}" dt="2024-06-11T06:39:23.556" v="71" actId="26606"/>
+        <pc:sldMkLst>
+          <pc:docMk/>
+          <pc:sldMk cId="3223591429" sldId="267"/>
+        </pc:sldMkLst>
+        <pc:spChg chg="mod">
+          <ac:chgData name="Moro, Marco" userId="d7bcd177-0ddd-42e9-8665-046e17e9d9ac" providerId="ADAL" clId="{647E9231-494A-4E99-9DD1-6F81CBDC05D0}" dt="2024-06-11T06:39:23.556" v="71" actId="26606"/>
+          <ac:spMkLst>
+            <pc:docMk/>
+            <pc:sldMk cId="3223591429" sldId="267"/>
+            <ac:spMk id="2" creationId="{E30A2BA4-5857-38D2-755B-0B2FE2397B87}"/>
+          </ac:spMkLst>
+        </pc:spChg>
+        <pc:spChg chg="del">
+          <ac:chgData name="Moro, Marco" userId="d7bcd177-0ddd-42e9-8665-046e17e9d9ac" providerId="ADAL" clId="{647E9231-494A-4E99-9DD1-6F81CBDC05D0}" dt="2024-06-11T06:38:46.456" v="63" actId="931"/>
+          <ac:spMkLst>
+            <pc:docMk/>
+            <pc:sldMk cId="3223591429" sldId="267"/>
+            <ac:spMk id="3" creationId="{7F21DB68-D3AA-EE69-5A70-E37F3ABCBD35}"/>
+          </ac:spMkLst>
+        </pc:spChg>
+        <pc:spChg chg="del">
+          <ac:chgData name="Moro, Marco" userId="d7bcd177-0ddd-42e9-8665-046e17e9d9ac" providerId="ADAL" clId="{647E9231-494A-4E99-9DD1-6F81CBDC05D0}" dt="2024-06-11T06:38:54.931" v="64" actId="931"/>
+          <ac:spMkLst>
+            <pc:docMk/>
+            <pc:sldMk cId="3223591429" sldId="267"/>
+            <ac:spMk id="4" creationId="{3E00B8D5-92F7-56AA-1637-3386D12DEE7F}"/>
+          </ac:spMkLst>
+        </pc:spChg>
+        <pc:spChg chg="add del">
+          <ac:chgData name="Moro, Marco" userId="d7bcd177-0ddd-42e9-8665-046e17e9d9ac" providerId="ADAL" clId="{647E9231-494A-4E99-9DD1-6F81CBDC05D0}" dt="2024-06-11T06:39:07.162" v="66" actId="26606"/>
+          <ac:spMkLst>
+            <pc:docMk/>
+            <pc:sldMk cId="3223591429" sldId="267"/>
+            <ac:spMk id="13" creationId="{022BDE4A-8A20-4A69-9C5A-581C82036A4D}"/>
+          </ac:spMkLst>
+        </pc:spChg>
+        <pc:spChg chg="add del">
+          <ac:chgData name="Moro, Marco" userId="d7bcd177-0ddd-42e9-8665-046e17e9d9ac" providerId="ADAL" clId="{647E9231-494A-4E99-9DD1-6F81CBDC05D0}" dt="2024-06-11T06:39:20.217" v="68" actId="26606"/>
+          <ac:spMkLst>
+            <pc:docMk/>
+            <pc:sldMk cId="3223591429" sldId="267"/>
+            <ac:spMk id="15" creationId="{99ED5833-B85B-4103-8A3B-CAB0308E6C15}"/>
+          </ac:spMkLst>
+        </pc:spChg>
+        <pc:spChg chg="add del">
+          <ac:chgData name="Moro, Marco" userId="d7bcd177-0ddd-42e9-8665-046e17e9d9ac" providerId="ADAL" clId="{647E9231-494A-4E99-9DD1-6F81CBDC05D0}" dt="2024-06-11T06:39:23.540" v="70" actId="26606"/>
+          <ac:spMkLst>
+            <pc:docMk/>
+            <pc:sldMk cId="3223591429" sldId="267"/>
+            <ac:spMk id="17" creationId="{99ED5833-B85B-4103-8A3B-CAB0308E6C15}"/>
+          </ac:spMkLst>
+        </pc:spChg>
+        <pc:spChg chg="add">
+          <ac:chgData name="Moro, Marco" userId="d7bcd177-0ddd-42e9-8665-046e17e9d9ac" providerId="ADAL" clId="{647E9231-494A-4E99-9DD1-6F81CBDC05D0}" dt="2024-06-11T06:39:23.556" v="71" actId="26606"/>
+          <ac:spMkLst>
+            <pc:docMk/>
+            <pc:sldMk cId="3223591429" sldId="267"/>
+            <ac:spMk id="19" creationId="{C4879EFC-8E62-4E00-973C-C45EE9EC676D}"/>
+          </ac:spMkLst>
+        </pc:spChg>
+        <pc:spChg chg="add">
+          <ac:chgData name="Moro, Marco" userId="d7bcd177-0ddd-42e9-8665-046e17e9d9ac" providerId="ADAL" clId="{647E9231-494A-4E99-9DD1-6F81CBDC05D0}" dt="2024-06-11T06:39:23.556" v="71" actId="26606"/>
+          <ac:spMkLst>
+            <pc:docMk/>
+            <pc:sldMk cId="3223591429" sldId="267"/>
+            <ac:spMk id="20" creationId="{D6A9C53F-5F90-40A5-8C85-5412D39C8C68}"/>
+          </ac:spMkLst>
+        </pc:spChg>
+        <pc:picChg chg="add mod ord">
+          <ac:chgData name="Moro, Marco" userId="d7bcd177-0ddd-42e9-8665-046e17e9d9ac" providerId="ADAL" clId="{647E9231-494A-4E99-9DD1-6F81CBDC05D0}" dt="2024-06-11T06:39:23.556" v="71" actId="26606"/>
+          <ac:picMkLst>
+            <pc:docMk/>
+            <pc:sldMk cId="3223591429" sldId="267"/>
+            <ac:picMk id="6" creationId="{3435D71E-538F-DEB7-7BED-3CDE006F260C}"/>
+          </ac:picMkLst>
+        </pc:picChg>
+        <pc:picChg chg="add mod">
+          <ac:chgData name="Moro, Marco" userId="d7bcd177-0ddd-42e9-8665-046e17e9d9ac" providerId="ADAL" clId="{647E9231-494A-4E99-9DD1-6F81CBDC05D0}" dt="2024-06-11T06:39:23.556" v="71" actId="26606"/>
+          <ac:picMkLst>
+            <pc:docMk/>
+            <pc:sldMk cId="3223591429" sldId="267"/>
+            <ac:picMk id="8" creationId="{B634B921-12B7-A774-C5B3-2D6238ABEEC0}"/>
+          </ac:picMkLst>
+        </pc:picChg>
       </pc:sldChg>
     </pc:docChg>
   </pc:docChgLst>
@@ -558,7 +646,7 @@
           <a:p>
             <a:fld id="{1076C589-445D-4DC3-9410-7A922580E96D}" type="datetimeFigureOut">
               <a:rPr lang="en-GB" smtClean="0"/>
-              <a:t>06/06/2024</a:t>
+              <a:t>11/06/2024</a:t>
             </a:fld>
             <a:endParaRPr lang="en-GB"/>
           </a:p>
@@ -758,7 +846,7 @@
           <a:p>
             <a:fld id="{1076C589-445D-4DC3-9410-7A922580E96D}" type="datetimeFigureOut">
               <a:rPr lang="en-GB" smtClean="0"/>
-              <a:t>06/06/2024</a:t>
+              <a:t>11/06/2024</a:t>
             </a:fld>
             <a:endParaRPr lang="en-GB"/>
           </a:p>
@@ -968,7 +1056,7 @@
           <a:p>
             <a:fld id="{1076C589-445D-4DC3-9410-7A922580E96D}" type="datetimeFigureOut">
               <a:rPr lang="en-GB" smtClean="0"/>
-              <a:t>06/06/2024</a:t>
+              <a:t>11/06/2024</a:t>
             </a:fld>
             <a:endParaRPr lang="en-GB"/>
           </a:p>
@@ -1168,7 +1256,7 @@
           <a:p>
             <a:fld id="{1076C589-445D-4DC3-9410-7A922580E96D}" type="datetimeFigureOut">
               <a:rPr lang="en-GB" smtClean="0"/>
-              <a:t>06/06/2024</a:t>
+              <a:t>11/06/2024</a:t>
             </a:fld>
             <a:endParaRPr lang="en-GB"/>
           </a:p>
@@ -1444,7 +1532,7 @@
           <a:p>
             <a:fld id="{1076C589-445D-4DC3-9410-7A922580E96D}" type="datetimeFigureOut">
               <a:rPr lang="en-GB" smtClean="0"/>
-              <a:t>06/06/2024</a:t>
+              <a:t>11/06/2024</a:t>
             </a:fld>
             <a:endParaRPr lang="en-GB"/>
           </a:p>
@@ -1712,7 +1800,7 @@
           <a:p>
             <a:fld id="{1076C589-445D-4DC3-9410-7A922580E96D}" type="datetimeFigureOut">
               <a:rPr lang="en-GB" smtClean="0"/>
-              <a:t>06/06/2024</a:t>
+              <a:t>11/06/2024</a:t>
             </a:fld>
             <a:endParaRPr lang="en-GB"/>
           </a:p>
@@ -2127,7 +2215,7 @@
           <a:p>
             <a:fld id="{1076C589-445D-4DC3-9410-7A922580E96D}" type="datetimeFigureOut">
               <a:rPr lang="en-GB" smtClean="0"/>
-              <a:t>06/06/2024</a:t>
+              <a:t>11/06/2024</a:t>
             </a:fld>
             <a:endParaRPr lang="en-GB"/>
           </a:p>
@@ -2269,7 +2357,7 @@
           <a:p>
             <a:fld id="{1076C589-445D-4DC3-9410-7A922580E96D}" type="datetimeFigureOut">
               <a:rPr lang="en-GB" smtClean="0"/>
-              <a:t>06/06/2024</a:t>
+              <a:t>11/06/2024</a:t>
             </a:fld>
             <a:endParaRPr lang="en-GB"/>
           </a:p>
@@ -2382,7 +2470,7 @@
           <a:p>
             <a:fld id="{1076C589-445D-4DC3-9410-7A922580E96D}" type="datetimeFigureOut">
               <a:rPr lang="en-GB" smtClean="0"/>
-              <a:t>06/06/2024</a:t>
+              <a:t>11/06/2024</a:t>
             </a:fld>
             <a:endParaRPr lang="en-GB"/>
           </a:p>
@@ -2695,7 +2783,7 @@
           <a:p>
             <a:fld id="{1076C589-445D-4DC3-9410-7A922580E96D}" type="datetimeFigureOut">
               <a:rPr lang="en-GB" smtClean="0"/>
-              <a:t>06/06/2024</a:t>
+              <a:t>11/06/2024</a:t>
             </a:fld>
             <a:endParaRPr lang="en-GB"/>
           </a:p>
@@ -2984,7 +3072,7 @@
           <a:p>
             <a:fld id="{1076C589-445D-4DC3-9410-7A922580E96D}" type="datetimeFigureOut">
               <a:rPr lang="en-GB" smtClean="0"/>
-              <a:t>06/06/2024</a:t>
+              <a:t>11/06/2024</a:t>
             </a:fld>
             <a:endParaRPr lang="en-GB"/>
           </a:p>
@@ -3227,7 +3315,7 @@
           <a:p>
             <a:fld id="{1076C589-445D-4DC3-9410-7A922580E96D}" type="datetimeFigureOut">
               <a:rPr lang="en-GB" smtClean="0"/>
-              <a:t>06/06/2024</a:t>
+              <a:t>11/06/2024</a:t>
             </a:fld>
             <a:endParaRPr lang="en-GB"/>
           </a:p>
@@ -4279,6 +4367,499 @@
     <p:extLst>
       <p:ext uri="{BB962C8B-B14F-4D97-AF65-F5344CB8AC3E}">
         <p14:creationId xmlns:p14="http://schemas.microsoft.com/office/powerpoint/2010/main" val="1792597823"/>
+      </p:ext>
+    </p:extLst>
+  </p:cSld>
+  <p:clrMapOvr>
+    <a:masterClrMapping/>
+  </p:clrMapOvr>
+</p:sld>
+</file>
+
+<file path=ppt/slides/slide12.xml><?xml version="1.0" encoding="utf-8"?>
+<p:sld xmlns:a="http://schemas.openxmlformats.org/drawingml/2006/main" xmlns:r="http://schemas.openxmlformats.org/officeDocument/2006/relationships" xmlns:p="http://schemas.openxmlformats.org/presentationml/2006/main">
+  <p:cSld>
+    <p:bg>
+      <p:bgPr>
+        <a:solidFill>
+          <a:schemeClr val="bg1"/>
+        </a:solidFill>
+        <a:effectLst/>
+      </p:bgPr>
+    </p:bg>
+    <p:spTree>
+      <p:nvGrpSpPr>
+        <p:cNvPr id="1" name=""/>
+        <p:cNvGrpSpPr/>
+        <p:nvPr/>
+      </p:nvGrpSpPr>
+      <p:grpSpPr>
+        <a:xfrm>
+          <a:off x="0" y="0"/>
+          <a:ext cx="0" cy="0"/>
+          <a:chOff x="0" y="0"/>
+          <a:chExt cx="0" cy="0"/>
+        </a:xfrm>
+      </p:grpSpPr>
+      <p:sp useBgFill="1">
+        <p:nvSpPr>
+          <p:cNvPr id="19" name="Rectangle 12">
+            <a:extLst>
+              <a:ext uri="{FF2B5EF4-FFF2-40B4-BE49-F238E27FC236}">
+                <a16:creationId xmlns:a16="http://schemas.microsoft.com/office/drawing/2014/main" id="{C4879EFC-8E62-4E00-973C-C45EE9EC676D}"/>
+              </a:ext>
+              <a:ext uri="{C183D7F6-B498-43B3-948B-1728B52AA6E4}">
+                <adec:decorative xmlns:adec="http://schemas.microsoft.com/office/drawing/2017/decorative" val="1"/>
+              </a:ext>
+            </a:extLst>
+          </p:cNvPr>
+          <p:cNvSpPr>
+            <a:spLocks noGrp="1" noRot="1" noChangeAspect="1" noMove="1" noResize="1" noEditPoints="1" noAdjustHandles="1" noChangeArrowheads="1" noChangeShapeType="1" noTextEdit="1"/>
+          </p:cNvSpPr>
+          <p:nvPr>
+            <p:extLst>
+              <p:ext uri="{386F3935-93C4-4BCD-93E2-E3B085C9AB24}">
+                <p16:designElem xmlns:p16="http://schemas.microsoft.com/office/powerpoint/2015/main" val="1"/>
+              </p:ext>
+            </p:extLst>
+          </p:nvPr>
+        </p:nvSpPr>
+        <p:spPr>
+          <a:xfrm>
+            <a:off x="0" y="0"/>
+            <a:ext cx="12188952" cy="6858000"/>
+          </a:xfrm>
+          <a:prstGeom prst="rect">
+            <a:avLst/>
+          </a:prstGeom>
+          <a:ln>
+            <a:noFill/>
+          </a:ln>
+        </p:spPr>
+        <p:style>
+          <a:lnRef idx="2">
+            <a:schemeClr val="accent1">
+              <a:shade val="50000"/>
+            </a:schemeClr>
+          </a:lnRef>
+          <a:fillRef idx="1">
+            <a:schemeClr val="accent1"/>
+          </a:fillRef>
+          <a:effectRef idx="0">
+            <a:schemeClr val="accent1"/>
+          </a:effectRef>
+          <a:fontRef idx="minor">
+            <a:schemeClr val="lt1"/>
+          </a:fontRef>
+        </p:style>
+        <p:txBody>
+          <a:bodyPr rtlCol="0" anchor="ctr"/>
+          <a:lstStyle/>
+          <a:p>
+            <a:pPr algn="ctr"/>
+            <a:endParaRPr lang="en-US"/>
+          </a:p>
+        </p:txBody>
+      </p:sp>
+      <p:sp>
+        <p:nvSpPr>
+          <p:cNvPr id="2" name="Title 1">
+            <a:extLst>
+              <a:ext uri="{FF2B5EF4-FFF2-40B4-BE49-F238E27FC236}">
+                <a16:creationId xmlns:a16="http://schemas.microsoft.com/office/drawing/2014/main" id="{E30A2BA4-5857-38D2-755B-0B2FE2397B87}"/>
+              </a:ext>
+            </a:extLst>
+          </p:cNvPr>
+          <p:cNvSpPr>
+            <a:spLocks noGrp="1"/>
+          </p:cNvSpPr>
+          <p:nvPr>
+            <p:ph type="title"/>
+          </p:nvPr>
+        </p:nvSpPr>
+        <p:spPr>
+          <a:xfrm>
+            <a:off x="638881" y="457200"/>
+            <a:ext cx="10909640" cy="1368614"/>
+          </a:xfrm>
+        </p:spPr>
+        <p:txBody>
+          <a:bodyPr vert="horz" lIns="91440" tIns="45720" rIns="91440" bIns="45720" rtlCol="0" anchor="ctr">
+            <a:normAutofit/>
+          </a:bodyPr>
+          <a:lstStyle/>
+          <a:p>
+            <a:pPr algn="ctr"/>
+            <a:r>
+              <a:rPr lang="en-US" sz="6600"/>
+              <a:t>Jenkins Scheduling </a:t>
+            </a:r>
+          </a:p>
+        </p:txBody>
+      </p:sp>
+      <p:sp>
+        <p:nvSpPr>
+          <p:cNvPr id="20" name="sketch line">
+            <a:extLst>
+              <a:ext uri="{FF2B5EF4-FFF2-40B4-BE49-F238E27FC236}">
+                <a16:creationId xmlns:a16="http://schemas.microsoft.com/office/drawing/2014/main" id="{D6A9C53F-5F90-40A5-8C85-5412D39C8C68}"/>
+              </a:ext>
+              <a:ext uri="{C183D7F6-B498-43B3-948B-1728B52AA6E4}">
+                <adec:decorative xmlns:adec="http://schemas.microsoft.com/office/drawing/2017/decorative" val="1"/>
+              </a:ext>
+            </a:extLst>
+          </p:cNvPr>
+          <p:cNvSpPr>
+            <a:spLocks noGrp="1" noRot="1" noChangeAspect="1" noMove="1" noResize="1" noEditPoints="1" noAdjustHandles="1" noChangeArrowheads="1" noChangeShapeType="1" noTextEdit="1"/>
+          </p:cNvSpPr>
+          <p:nvPr>
+            <p:extLst>
+              <p:ext uri="{386F3935-93C4-4BCD-93E2-E3B085C9AB24}">
+                <p16:designElem xmlns:p16="http://schemas.microsoft.com/office/powerpoint/2015/main" val="1"/>
+              </p:ext>
+            </p:extLst>
+          </p:nvPr>
+        </p:nvSpPr>
+        <p:spPr>
+          <a:xfrm>
+            <a:off x="4450080" y="1850683"/>
+            <a:ext cx="3291840" cy="18288"/>
+          </a:xfrm>
+          <a:custGeom>
+            <a:avLst/>
+            <a:gdLst>
+              <a:gd name="connsiteX0" fmla="*/ 0 w 3291840"/>
+              <a:gd name="connsiteY0" fmla="*/ 0 h 18288"/>
+              <a:gd name="connsiteX1" fmla="*/ 658368 w 3291840"/>
+              <a:gd name="connsiteY1" fmla="*/ 0 h 18288"/>
+              <a:gd name="connsiteX2" fmla="*/ 1283818 w 3291840"/>
+              <a:gd name="connsiteY2" fmla="*/ 0 h 18288"/>
+              <a:gd name="connsiteX3" fmla="*/ 1909267 w 3291840"/>
+              <a:gd name="connsiteY3" fmla="*/ 0 h 18288"/>
+              <a:gd name="connsiteX4" fmla="*/ 2633472 w 3291840"/>
+              <a:gd name="connsiteY4" fmla="*/ 0 h 18288"/>
+              <a:gd name="connsiteX5" fmla="*/ 3291840 w 3291840"/>
+              <a:gd name="connsiteY5" fmla="*/ 0 h 18288"/>
+              <a:gd name="connsiteX6" fmla="*/ 3291840 w 3291840"/>
+              <a:gd name="connsiteY6" fmla="*/ 18288 h 18288"/>
+              <a:gd name="connsiteX7" fmla="*/ 2633472 w 3291840"/>
+              <a:gd name="connsiteY7" fmla="*/ 18288 h 18288"/>
+              <a:gd name="connsiteX8" fmla="*/ 2073859 w 3291840"/>
+              <a:gd name="connsiteY8" fmla="*/ 18288 h 18288"/>
+              <a:gd name="connsiteX9" fmla="*/ 1448410 w 3291840"/>
+              <a:gd name="connsiteY9" fmla="*/ 18288 h 18288"/>
+              <a:gd name="connsiteX10" fmla="*/ 822960 w 3291840"/>
+              <a:gd name="connsiteY10" fmla="*/ 18288 h 18288"/>
+              <a:gd name="connsiteX11" fmla="*/ 0 w 3291840"/>
+              <a:gd name="connsiteY11" fmla="*/ 18288 h 18288"/>
+              <a:gd name="connsiteX12" fmla="*/ 0 w 3291840"/>
+              <a:gd name="connsiteY12" fmla="*/ 0 h 18288"/>
+            </a:gdLst>
+            <a:ahLst/>
+            <a:cxnLst>
+              <a:cxn ang="0">
+                <a:pos x="connsiteX0" y="connsiteY0"/>
+              </a:cxn>
+              <a:cxn ang="0">
+                <a:pos x="connsiteX1" y="connsiteY1"/>
+              </a:cxn>
+              <a:cxn ang="0">
+                <a:pos x="connsiteX2" y="connsiteY2"/>
+              </a:cxn>
+              <a:cxn ang="0">
+                <a:pos x="connsiteX3" y="connsiteY3"/>
+              </a:cxn>
+              <a:cxn ang="0">
+                <a:pos x="connsiteX4" y="connsiteY4"/>
+              </a:cxn>
+              <a:cxn ang="0">
+                <a:pos x="connsiteX5" y="connsiteY5"/>
+              </a:cxn>
+              <a:cxn ang="0">
+                <a:pos x="connsiteX6" y="connsiteY6"/>
+              </a:cxn>
+              <a:cxn ang="0">
+                <a:pos x="connsiteX7" y="connsiteY7"/>
+              </a:cxn>
+              <a:cxn ang="0">
+                <a:pos x="connsiteX8" y="connsiteY8"/>
+              </a:cxn>
+              <a:cxn ang="0">
+                <a:pos x="connsiteX9" y="connsiteY9"/>
+              </a:cxn>
+              <a:cxn ang="0">
+                <a:pos x="connsiteX10" y="connsiteY10"/>
+              </a:cxn>
+              <a:cxn ang="0">
+                <a:pos x="connsiteX11" y="connsiteY11"/>
+              </a:cxn>
+              <a:cxn ang="0">
+                <a:pos x="connsiteX12" y="connsiteY12"/>
+              </a:cxn>
+            </a:cxnLst>
+            <a:rect l="l" t="t" r="r" b="b"/>
+            <a:pathLst>
+              <a:path w="3291840" h="18288" fill="none" extrusionOk="0">
+                <a:moveTo>
+                  <a:pt x="0" y="0"/>
+                </a:moveTo>
+                <a:cubicBezTo>
+                  <a:pt x="173077" y="-20031"/>
+                  <a:pt x="443104" y="6424"/>
+                  <a:pt x="658368" y="0"/>
+                </a:cubicBezTo>
+                <a:cubicBezTo>
+                  <a:pt x="873632" y="-6424"/>
+                  <a:pt x="1034028" y="11764"/>
+                  <a:pt x="1283818" y="0"/>
+                </a:cubicBezTo>
+                <a:cubicBezTo>
+                  <a:pt x="1533608" y="-11764"/>
+                  <a:pt x="1691227" y="-30112"/>
+                  <a:pt x="1909267" y="0"/>
+                </a:cubicBezTo>
+                <a:cubicBezTo>
+                  <a:pt x="2127307" y="30112"/>
+                  <a:pt x="2272465" y="-18735"/>
+                  <a:pt x="2633472" y="0"/>
+                </a:cubicBezTo>
+                <a:cubicBezTo>
+                  <a:pt x="2994479" y="18735"/>
+                  <a:pt x="3023324" y="-32030"/>
+                  <a:pt x="3291840" y="0"/>
+                </a:cubicBezTo>
+                <a:cubicBezTo>
+                  <a:pt x="3291406" y="7551"/>
+                  <a:pt x="3291373" y="9822"/>
+                  <a:pt x="3291840" y="18288"/>
+                </a:cubicBezTo>
+                <a:cubicBezTo>
+                  <a:pt x="3048445" y="38989"/>
+                  <a:pt x="2846548" y="-14400"/>
+                  <a:pt x="2633472" y="18288"/>
+                </a:cubicBezTo>
+                <a:cubicBezTo>
+                  <a:pt x="2420396" y="50976"/>
+                  <a:pt x="2304099" y="6336"/>
+                  <a:pt x="2073859" y="18288"/>
+                </a:cubicBezTo>
+                <a:cubicBezTo>
+                  <a:pt x="1843619" y="30240"/>
+                  <a:pt x="1706926" y="10778"/>
+                  <a:pt x="1448410" y="18288"/>
+                </a:cubicBezTo>
+                <a:cubicBezTo>
+                  <a:pt x="1189894" y="25798"/>
+                  <a:pt x="1002278" y="8992"/>
+                  <a:pt x="822960" y="18288"/>
+                </a:cubicBezTo>
+                <a:cubicBezTo>
+                  <a:pt x="643642" y="27585"/>
+                  <a:pt x="307039" y="38051"/>
+                  <a:pt x="0" y="18288"/>
+                </a:cubicBezTo>
+                <a:cubicBezTo>
+                  <a:pt x="60" y="11696"/>
+                  <a:pt x="66" y="3758"/>
+                  <a:pt x="0" y="0"/>
+                </a:cubicBezTo>
+                <a:close/>
+              </a:path>
+              <a:path w="3291840" h="18288" stroke="0" extrusionOk="0">
+                <a:moveTo>
+                  <a:pt x="0" y="0"/>
+                </a:moveTo>
+                <a:cubicBezTo>
+                  <a:pt x="195850" y="28018"/>
+                  <a:pt x="434891" y="17390"/>
+                  <a:pt x="592531" y="0"/>
+                </a:cubicBezTo>
+                <a:cubicBezTo>
+                  <a:pt x="750171" y="-17390"/>
+                  <a:pt x="1018709" y="32200"/>
+                  <a:pt x="1316736" y="0"/>
+                </a:cubicBezTo>
+                <a:cubicBezTo>
+                  <a:pt x="1614763" y="-32200"/>
+                  <a:pt x="1696480" y="-11367"/>
+                  <a:pt x="1876349" y="0"/>
+                </a:cubicBezTo>
+                <a:cubicBezTo>
+                  <a:pt x="2056218" y="11367"/>
+                  <a:pt x="2193364" y="13433"/>
+                  <a:pt x="2435962" y="0"/>
+                </a:cubicBezTo>
+                <a:cubicBezTo>
+                  <a:pt x="2678560" y="-13433"/>
+                  <a:pt x="3010901" y="-42367"/>
+                  <a:pt x="3291840" y="0"/>
+                </a:cubicBezTo>
+                <a:cubicBezTo>
+                  <a:pt x="3291758" y="4406"/>
+                  <a:pt x="3291751" y="9982"/>
+                  <a:pt x="3291840" y="18288"/>
+                </a:cubicBezTo>
+                <a:cubicBezTo>
+                  <a:pt x="3108993" y="14228"/>
+                  <a:pt x="2952658" y="46900"/>
+                  <a:pt x="2666390" y="18288"/>
+                </a:cubicBezTo>
+                <a:cubicBezTo>
+                  <a:pt x="2380122" y="-10324"/>
+                  <a:pt x="2263855" y="41055"/>
+                  <a:pt x="2040941" y="18288"/>
+                </a:cubicBezTo>
+                <a:cubicBezTo>
+                  <a:pt x="1818027" y="-4479"/>
+                  <a:pt x="1675097" y="6509"/>
+                  <a:pt x="1415491" y="18288"/>
+                </a:cubicBezTo>
+                <a:cubicBezTo>
+                  <a:pt x="1155885" y="30068"/>
+                  <a:pt x="852976" y="36210"/>
+                  <a:pt x="691286" y="18288"/>
+                </a:cubicBezTo>
+                <a:cubicBezTo>
+                  <a:pt x="529596" y="366"/>
+                  <a:pt x="187183" y="13912"/>
+                  <a:pt x="0" y="18288"/>
+                </a:cubicBezTo>
+                <a:cubicBezTo>
+                  <a:pt x="189" y="14288"/>
+                  <a:pt x="-703" y="3747"/>
+                  <a:pt x="0" y="0"/>
+                </a:cubicBezTo>
+                <a:close/>
+              </a:path>
+            </a:pathLst>
+          </a:custGeom>
+          <a:solidFill>
+            <a:schemeClr val="accent2"/>
+          </a:solidFill>
+          <a:ln w="41275" cap="rnd">
+            <a:solidFill>
+              <a:schemeClr val="accent2"/>
+            </a:solidFill>
+            <a:round/>
+            <a:extLst>
+              <a:ext uri="{C807C97D-BFC1-408E-A445-0C87EB9F89A2}">
+                <ask:lineSketchStyleProps xmlns:ask="http://schemas.microsoft.com/office/drawing/2018/sketchyshapes" sd="2863741219">
+                  <a:prstGeom prst="rect">
+                    <a:avLst/>
+                  </a:prstGeom>
+                  <ask:type>
+                    <ask:lineSketchFreehand/>
+                  </ask:type>
+                </ask:lineSketchStyleProps>
+              </a:ext>
+            </a:extLst>
+          </a:ln>
+        </p:spPr>
+        <p:style>
+          <a:lnRef idx="2">
+            <a:schemeClr val="accent1">
+              <a:shade val="50000"/>
+            </a:schemeClr>
+          </a:lnRef>
+          <a:fillRef idx="1">
+            <a:schemeClr val="accent1"/>
+          </a:fillRef>
+          <a:effectRef idx="0">
+            <a:schemeClr val="accent1"/>
+          </a:effectRef>
+          <a:fontRef idx="minor">
+            <a:schemeClr val="lt1"/>
+          </a:fontRef>
+        </p:style>
+        <p:txBody>
+          <a:bodyPr rtlCol="0" anchor="ctr"/>
+          <a:lstStyle/>
+          <a:p>
+            <a:pPr algn="ctr"/>
+            <a:endParaRPr lang="en-US"/>
+          </a:p>
+        </p:txBody>
+      </p:sp>
+      <p:pic>
+        <p:nvPicPr>
+          <p:cNvPr id="6" name="Content Placeholder 5" descr="A screenshot of a computer&#10;&#10;Description automatically generated">
+            <a:extLst>
+              <a:ext uri="{FF2B5EF4-FFF2-40B4-BE49-F238E27FC236}">
+                <a16:creationId xmlns:a16="http://schemas.microsoft.com/office/drawing/2014/main" id="{3435D71E-538F-DEB7-7BED-3CDE006F260C}"/>
+              </a:ext>
+            </a:extLst>
+          </p:cNvPr>
+          <p:cNvPicPr>
+            <a:picLocks noGrp="1" noChangeAspect="1"/>
+          </p:cNvPicPr>
+          <p:nvPr>
+            <p:ph sz="half" idx="1"/>
+          </p:nvPr>
+        </p:nvPicPr>
+        <p:blipFill>
+          <a:blip r:embed="rId2">
+            <a:extLst>
+              <a:ext uri="{28A0092B-C50C-407E-A947-70E740481C1C}">
+                <a14:useLocalDpi xmlns:a14="http://schemas.microsoft.com/office/drawing/2010/main" val="0"/>
+              </a:ext>
+            </a:extLst>
+          </a:blip>
+          <a:stretch>
+            <a:fillRect/>
+          </a:stretch>
+        </p:blipFill>
+        <p:spPr>
+          <a:xfrm>
+            <a:off x="1151476" y="2642616"/>
+            <a:ext cx="3951544" cy="3605784"/>
+          </a:xfrm>
+          <a:prstGeom prst="rect">
+            <a:avLst/>
+          </a:prstGeom>
+        </p:spPr>
+      </p:pic>
+      <p:pic>
+        <p:nvPicPr>
+          <p:cNvPr id="8" name="Content Placeholder 7" descr="A screenshot of a computer&#10;&#10;Description automatically generated">
+            <a:extLst>
+              <a:ext uri="{FF2B5EF4-FFF2-40B4-BE49-F238E27FC236}">
+                <a16:creationId xmlns:a16="http://schemas.microsoft.com/office/drawing/2014/main" id="{B634B921-12B7-A774-C5B3-2D6238ABEEC0}"/>
+              </a:ext>
+            </a:extLst>
+          </p:cNvPr>
+          <p:cNvPicPr>
+            <a:picLocks noGrp="1" noChangeAspect="1"/>
+          </p:cNvPicPr>
+          <p:nvPr>
+            <p:ph sz="half" idx="2"/>
+          </p:nvPr>
+        </p:nvPicPr>
+        <p:blipFill>
+          <a:blip r:embed="rId3">
+            <a:extLst>
+              <a:ext uri="{28A0092B-C50C-407E-A947-70E740481C1C}">
+                <a14:useLocalDpi xmlns:a14="http://schemas.microsoft.com/office/drawing/2010/main" val="0"/>
+              </a:ext>
+            </a:extLst>
+          </a:blip>
+          <a:stretch>
+            <a:fillRect/>
+          </a:stretch>
+        </p:blipFill>
+        <p:spPr>
+          <a:xfrm>
+            <a:off x="6254496" y="3154192"/>
+            <a:ext cx="5614416" cy="2582631"/>
+          </a:xfrm>
+          <a:prstGeom prst="rect">
+            <a:avLst/>
+          </a:prstGeom>
+        </p:spPr>
+      </p:pic>
+    </p:spTree>
+    <p:extLst>
+      <p:ext uri="{BB962C8B-B14F-4D97-AF65-F5344CB8AC3E}">
+        <p14:creationId xmlns:p14="http://schemas.microsoft.com/office/powerpoint/2010/main" val="3223591429"/>
       </p:ext>
     </p:extLst>
   </p:cSld>

</xml_diff>